<commit_message>
Fixed foil for this.PI
</commit_message>
<xml_diff>
--- a/node/lesson-45-modules/modules.pptx
+++ b/node/lesson-45-modules/modules.pptx
@@ -27,7 +27,7 @@
   <p:sldSz cx="9144000" cy="6858000" type="screen4x3"/>
   <p:notesSz cx="6858000" cy="9144000"/>
   <p:custDataLst>
-    <p:tags r:id="rId17"/>
+    <p:tags r:id="rId16"/>
   </p:custDataLst>
   <p:defaultTextStyle>
     <a:defPPr>
@@ -1142,7 +1142,7 @@
   <p:timing>
     <p:tnLst>
       <p:par>
-        <p:cTn xmlns:p14="http://schemas.microsoft.com/office/powerpoint/2010/main" id="1" dur="indefinite" restart="never" nodeType="tmRoot"/>
+        <p:cTn id="1" dur="indefinite" restart="never" nodeType="tmRoot"/>
       </p:par>
     </p:tnLst>
   </p:timing>
@@ -1197,7 +1197,7 @@
           </a:prstGeom>
           <a:noFill/>
           <a:extLst>
-            <a:ext uri="{909E8E84-426E-40dd-AFC4-6F175D3DCCD1}">
+            <a:ext uri="{909E8E84-426E-40DD-AFC4-6F175D3DCCD1}">
               <a14:hiddenFill xmlns:a14="http://schemas.microsoft.com/office/drawing/2010/main">
                 <a:solidFill>
                   <a:srgbClr val="FFFFFF"/>
@@ -1353,7 +1353,7 @@
   <p:timing>
     <p:tnLst>
       <p:par>
-        <p:cTn xmlns:p14="http://schemas.microsoft.com/office/powerpoint/2010/main" id="1" dur="indefinite" restart="never" nodeType="tmRoot"/>
+        <p:cTn id="1" dur="indefinite" restart="never" nodeType="tmRoot"/>
       </p:par>
     </p:tnLst>
   </p:timing>
@@ -1808,7 +1808,7 @@
   <p:timing>
     <p:tnLst>
       <p:par>
-        <p:cTn xmlns:p14="http://schemas.microsoft.com/office/powerpoint/2010/main" id="1" dur="indefinite" restart="never" nodeType="tmRoot"/>
+        <p:cTn id="1" dur="indefinite" restart="never" nodeType="tmRoot"/>
       </p:par>
     </p:tnLst>
   </p:timing>
@@ -2148,7 +2148,7 @@
   <p:timing>
     <p:tnLst>
       <p:par>
-        <p:cTn xmlns:p14="http://schemas.microsoft.com/office/powerpoint/2010/main" id="1" dur="indefinite" restart="never" nodeType="tmRoot"/>
+        <p:cTn id="1" dur="indefinite" restart="never" nodeType="tmRoot"/>
       </p:par>
     </p:tnLst>
   </p:timing>
@@ -2636,7 +2636,7 @@
   <p:timing>
     <p:tnLst>
       <p:par>
-        <p:cTn xmlns:p14="http://schemas.microsoft.com/office/powerpoint/2010/main" id="1" dur="indefinite" restart="never" nodeType="tmRoot"/>
+        <p:cTn id="1" dur="indefinite" restart="never" nodeType="tmRoot"/>
       </p:par>
     </p:tnLst>
   </p:timing>
@@ -2994,7 +2994,7 @@
   <p:timing>
     <p:tnLst>
       <p:par>
-        <p:cTn xmlns:p14="http://schemas.microsoft.com/office/powerpoint/2010/main" id="1" dur="indefinite" restart="never" nodeType="tmRoot"/>
+        <p:cTn id="1" dur="indefinite" restart="never" nodeType="tmRoot"/>
       </p:par>
     </p:tnLst>
   </p:timing>
@@ -3155,7 +3155,21 @@
                 <a:latin typeface="Monaco"/>
                 <a:cs typeface="Monaco"/>
               </a:rPr>
-              <a:t>   return PI </a:t>
+              <a:t>   return </a:t>
+            </a:r>
+            <a:r>
+              <a:rPr lang="en-US" sz="1200" dirty="0" err="1" smtClean="0">
+                <a:latin typeface="Monaco"/>
+                <a:cs typeface="Monaco"/>
+              </a:rPr>
+              <a:t>this.PI</a:t>
+            </a:r>
+            <a:r>
+              <a:rPr lang="en-US" sz="1200" dirty="0" smtClean="0">
+                <a:latin typeface="Monaco"/>
+                <a:cs typeface="Monaco"/>
+              </a:rPr>
+              <a:t> </a:t>
             </a:r>
             <a:r>
               <a:rPr lang="en-US" sz="1200" dirty="0">
@@ -3256,11 +3270,18 @@
               <a:t>2 * </a:t>
             </a:r>
             <a:r>
+              <a:rPr lang="en-US" sz="1200" dirty="0" err="1" smtClean="0">
+                <a:latin typeface="Monaco"/>
+                <a:cs typeface="Monaco"/>
+              </a:rPr>
+              <a:t>this.PI</a:t>
+            </a:r>
+            <a:r>
               <a:rPr lang="en-US" sz="1200" dirty="0" smtClean="0">
                 <a:latin typeface="Monaco"/>
                 <a:cs typeface="Monaco"/>
               </a:rPr>
-              <a:t>PI </a:t>
+              <a:t> </a:t>
             </a:r>
             <a:r>
               <a:rPr lang="en-US" sz="1200" dirty="0">
@@ -4209,7 +4230,7 @@
   <p:timing>
     <p:tnLst>
       <p:par>
-        <p:cTn xmlns:p14="http://schemas.microsoft.com/office/powerpoint/2010/main" id="1" dur="indefinite" restart="never" nodeType="tmRoot"/>
+        <p:cTn id="1" dur="indefinite" restart="never" nodeType="tmRoot"/>
       </p:par>
     </p:tnLst>
   </p:timing>
@@ -4768,7 +4789,7 @@
   <p:timing>
     <p:tnLst>
       <p:par>
-        <p:cTn xmlns:p14="http://schemas.microsoft.com/office/powerpoint/2010/main" id="1" dur="indefinite" restart="never" nodeType="tmRoot"/>
+        <p:cTn id="1" dur="indefinite" restart="never" nodeType="tmRoot"/>
       </p:par>
     </p:tnLst>
   </p:timing>
@@ -4809,15 +4830,7 @@
           <a:p>
             <a:r>
               <a:rPr lang="en-US" sz="2000" dirty="0" smtClean="0"/>
-              <a:t>Modules: </a:t>
-            </a:r>
-            <a:r>
-              <a:rPr lang="en-US" sz="2000" dirty="0" smtClean="0"/>
-              <a:t>self</a:t>
-            </a:r>
-            <a:r>
-              <a:rPr lang="en-US" sz="2000" dirty="0" smtClean="0"/>
-              <a:t>-contained behavior</a:t>
+              <a:t>Modules: self-contained behavior</a:t>
             </a:r>
           </a:p>
           <a:p>
@@ -4834,15 +4847,7 @@
             </a:r>
             <a:r>
               <a:rPr lang="en-US" sz="2000" dirty="0" smtClean="0"/>
-              <a:t>): </a:t>
-            </a:r>
-            <a:r>
-              <a:rPr lang="en-US" sz="2000" dirty="0" smtClean="0"/>
-              <a:t>installs </a:t>
-            </a:r>
-            <a:r>
-              <a:rPr lang="en-US" sz="2000" dirty="0" smtClean="0"/>
-              <a:t>&amp; uninstalls modules</a:t>
+              <a:t>): installs &amp; uninstalls modules</a:t>
             </a:r>
             <a:endParaRPr lang="en-US" sz="1800" dirty="0" smtClean="0">
               <a:latin typeface="Monaco"/>
@@ -4852,32 +4857,20 @@
           <a:p>
             <a:r>
               <a:rPr lang="en-US" sz="2000" dirty="0" smtClean="0"/>
-              <a:t>Using modules: </a:t>
-            </a:r>
+              <a:t>Using modules: use </a:t>
+            </a:r>
+            <a:r>
+              <a:rPr lang="en-US" sz="1800" dirty="0" smtClean="0">
+                <a:latin typeface="Monaco"/>
+                <a:cs typeface="Monaco"/>
+              </a:rPr>
+              <a:t>require('module')</a:t>
+            </a:r>
+          </a:p>
+          <a:p>
             <a:r>
               <a:rPr lang="en-US" sz="2000" dirty="0" smtClean="0"/>
-              <a:t>use </a:t>
-            </a:r>
-            <a:r>
-              <a:rPr lang="en-US" sz="1800" dirty="0" smtClean="0">
-                <a:latin typeface="Monaco"/>
-                <a:cs typeface="Monaco"/>
-              </a:rPr>
-              <a:t>require('module')</a:t>
-            </a:r>
-          </a:p>
-          <a:p>
-            <a:r>
-              <a:rPr lang="en-US" sz="2000" dirty="0" smtClean="0"/>
-              <a:t>Writing modules</a:t>
-            </a:r>
-            <a:r>
-              <a:rPr lang="en-US" sz="2000" dirty="0" smtClean="0"/>
-              <a:t>: </a:t>
-            </a:r>
-            <a:r>
-              <a:rPr lang="en-US" sz="2000" dirty="0" smtClean="0"/>
-              <a:t>remember </a:t>
+              <a:t>Writing modules: remember </a:t>
             </a:r>
             <a:r>
               <a:rPr lang="en-US" sz="2000" dirty="0" err="1" smtClean="0"/>
@@ -4991,7 +4984,7 @@
   <p:timing>
     <p:tnLst>
       <p:par>
-        <p:cTn xmlns:p14="http://schemas.microsoft.com/office/powerpoint/2010/main" id="1" dur="indefinite" restart="never" nodeType="tmRoot"/>
+        <p:cTn id="1" dur="indefinite" restart="never" nodeType="tmRoot"/>
       </p:par>
     </p:tnLst>
   </p:timing>
@@ -5152,7 +5145,7 @@
   <p:timing>
     <p:tnLst>
       <p:par>
-        <p:cTn xmlns:p14="http://schemas.microsoft.com/office/powerpoint/2010/main" id="1" dur="indefinite" restart="never" nodeType="tmRoot"/>
+        <p:cTn id="1" dur="indefinite" restart="never" nodeType="tmRoot"/>
       </p:par>
     </p:tnLst>
   </p:timing>
@@ -5246,11 +5239,7 @@
           <a:p>
             <a:r>
               <a:rPr lang="en-US" dirty="0" smtClean="0"/>
-              <a:t>To </a:t>
-            </a:r>
-            <a:r>
-              <a:rPr lang="en-US" dirty="0" smtClean="0"/>
-              <a:t>export an artifact from a module, use Node's </a:t>
+              <a:t>To export an artifact from a module, use Node's </a:t>
             </a:r>
             <a:r>
               <a:rPr lang="en-US" sz="2000" dirty="0" smtClean="0">
@@ -5346,7 +5335,7 @@
   <p:timing>
     <p:tnLst>
       <p:par>
-        <p:cTn xmlns:p14="http://schemas.microsoft.com/office/powerpoint/2010/main" id="1" dur="indefinite" restart="never" nodeType="tmRoot"/>
+        <p:cTn id="1" dur="indefinite" restart="never" nodeType="tmRoot"/>
       </p:par>
     </p:tnLst>
   </p:timing>
@@ -6251,7 +6240,7 @@
   <p:timing>
     <p:tnLst>
       <p:par>
-        <p:cTn xmlns:p14="http://schemas.microsoft.com/office/powerpoint/2010/main" id="1" dur="indefinite" restart="never" nodeType="tmRoot"/>
+        <p:cTn id="1" dur="indefinite" restart="never" nodeType="tmRoot"/>
       </p:par>
     </p:tnLst>
   </p:timing>
@@ -6753,7 +6742,7 @@
   <p:timing>
     <p:tnLst>
       <p:par>
-        <p:cTn xmlns:p14="http://schemas.microsoft.com/office/powerpoint/2010/main" id="1" dur="indefinite" restart="never" nodeType="tmRoot"/>
+        <p:cTn id="1" dur="indefinite" restart="never" nodeType="tmRoot"/>
       </p:par>
     </p:tnLst>
   </p:timing>
@@ -7049,7 +7038,7 @@
   <p:timing>
     <p:tnLst>
       <p:par>
-        <p:cTn xmlns:p14="http://schemas.microsoft.com/office/powerpoint/2010/main" id="1" dur="indefinite" restart="never" nodeType="tmRoot"/>
+        <p:cTn id="1" dur="indefinite" restart="never" nodeType="tmRoot"/>
       </p:par>
     </p:tnLst>
   </p:timing>
@@ -7358,7 +7347,7 @@
   <p:timing>
     <p:tnLst>
       <p:par>
-        <p:cTn xmlns:p14="http://schemas.microsoft.com/office/powerpoint/2010/main" id="1" dur="indefinite" restart="never" nodeType="tmRoot"/>
+        <p:cTn id="1" dur="indefinite" restart="never" nodeType="tmRoot"/>
       </p:par>
     </p:tnLst>
   </p:timing>
@@ -8023,7 +8012,7 @@
   <p:timing>
     <p:tnLst>
       <p:par>
-        <p:cTn xmlns:p14="http://schemas.microsoft.com/office/powerpoint/2010/main" id="1" dur="indefinite" restart="never" nodeType="tmRoot"/>
+        <p:cTn id="1" dur="indefinite" restart="never" nodeType="tmRoot"/>
       </p:par>
     </p:tnLst>
   </p:timing>
@@ -8207,7 +8196,7 @@
   <p:timing>
     <p:tnLst>
       <p:par>
-        <p:cTn xmlns:p14="http://schemas.microsoft.com/office/powerpoint/2010/main" id="1" dur="indefinite" restart="never" nodeType="tmRoot"/>
+        <p:cTn id="1" dur="indefinite" restart="never" nodeType="tmRoot"/>
       </p:par>
     </p:tnLst>
   </p:timing>

</xml_diff>

<commit_message>
Added changes for language
</commit_message>
<xml_diff>
--- a/node/lesson-45-modules/modules.pptx
+++ b/node/lesson-45-modules/modules.pptx
@@ -27,7 +27,7 @@
   <p:sldSz cx="9144000" cy="6858000" type="screen4x3"/>
   <p:notesSz cx="6858000" cy="9144000"/>
   <p:custDataLst>
-    <p:tags r:id="rId16"/>
+    <p:tags r:id="rId17"/>
   </p:custDataLst>
   <p:defaultTextStyle>
     <a:defPPr>
@@ -1142,7 +1142,7 @@
   <p:timing>
     <p:tnLst>
       <p:par>
-        <p:cTn id="1" dur="indefinite" restart="never" nodeType="tmRoot"/>
+        <p:cTn xmlns:p14="http://schemas.microsoft.com/office/powerpoint/2010/main" id="1" dur="indefinite" restart="never" nodeType="tmRoot"/>
       </p:par>
     </p:tnLst>
   </p:timing>
@@ -1197,7 +1197,7 @@
           </a:prstGeom>
           <a:noFill/>
           <a:extLst>
-            <a:ext uri="{909E8E84-426E-40DD-AFC4-6F175D3DCCD1}">
+            <a:ext uri="{909E8E84-426E-40dd-AFC4-6F175D3DCCD1}">
               <a14:hiddenFill xmlns:a14="http://schemas.microsoft.com/office/drawing/2010/main">
                 <a:solidFill>
                   <a:srgbClr val="FFFFFF"/>
@@ -1353,7 +1353,7 @@
   <p:timing>
     <p:tnLst>
       <p:par>
-        <p:cTn id="1" dur="indefinite" restart="never" nodeType="tmRoot"/>
+        <p:cTn xmlns:p14="http://schemas.microsoft.com/office/powerpoint/2010/main" id="1" dur="indefinite" restart="never" nodeType="tmRoot"/>
       </p:par>
     </p:tnLst>
   </p:timing>
@@ -1808,7 +1808,7 @@
   <p:timing>
     <p:tnLst>
       <p:par>
-        <p:cTn id="1" dur="indefinite" restart="never" nodeType="tmRoot"/>
+        <p:cTn xmlns:p14="http://schemas.microsoft.com/office/powerpoint/2010/main" id="1" dur="indefinite" restart="never" nodeType="tmRoot"/>
       </p:par>
     </p:tnLst>
   </p:timing>
@@ -2148,7 +2148,7 @@
   <p:timing>
     <p:tnLst>
       <p:par>
-        <p:cTn id="1" dur="indefinite" restart="never" nodeType="tmRoot"/>
+        <p:cTn xmlns:p14="http://schemas.microsoft.com/office/powerpoint/2010/main" id="1" dur="indefinite" restart="never" nodeType="tmRoot"/>
       </p:par>
     </p:tnLst>
   </p:timing>
@@ -2636,7 +2636,7 @@
   <p:timing>
     <p:tnLst>
       <p:par>
-        <p:cTn id="1" dur="indefinite" restart="never" nodeType="tmRoot"/>
+        <p:cTn xmlns:p14="http://schemas.microsoft.com/office/powerpoint/2010/main" id="1" dur="indefinite" restart="never" nodeType="tmRoot"/>
       </p:par>
     </p:tnLst>
   </p:timing>
@@ -2994,7 +2994,7 @@
   <p:timing>
     <p:tnLst>
       <p:par>
-        <p:cTn id="1" dur="indefinite" restart="never" nodeType="tmRoot"/>
+        <p:cTn xmlns:p14="http://schemas.microsoft.com/office/powerpoint/2010/main" id="1" dur="indefinite" restart="never" nodeType="tmRoot"/>
       </p:par>
     </p:tnLst>
   </p:timing>
@@ -3913,14 +3913,7 @@
                 <a:latin typeface="Monaco"/>
                 <a:cs typeface="Monaco"/>
               </a:rPr>
-              <a:t> </a:t>
-            </a:r>
-            <a:r>
-              <a:rPr lang="en-US" sz="1200" dirty="0" smtClean="0">
-                <a:latin typeface="Monaco"/>
-                <a:cs typeface="Monaco"/>
-              </a:rPr>
-              <a:t>* r * r;</a:t>
+              <a:t> * r * r;</a:t>
             </a:r>
           </a:p>
           <a:p>
@@ -3986,28 +3979,14 @@
                 <a:latin typeface="Monaco"/>
                 <a:cs typeface="Monaco"/>
               </a:rPr>
-              <a:t>this</a:t>
-            </a:r>
-            <a:r>
-              <a:rPr lang="en-US" sz="1200" smtClean="0">
-                <a:latin typeface="Monaco"/>
-                <a:cs typeface="Monaco"/>
-              </a:rPr>
-              <a:t>.PI</a:t>
+              <a:t>this.PI</a:t>
             </a:r>
             <a:r>
               <a:rPr lang="en-US" sz="1200" dirty="0" smtClean="0">
                 <a:latin typeface="Monaco"/>
                 <a:cs typeface="Monaco"/>
               </a:rPr>
-              <a:t> </a:t>
-            </a:r>
-            <a:r>
-              <a:rPr lang="en-US" sz="1200" dirty="0" smtClean="0">
-                <a:latin typeface="Monaco"/>
-                <a:cs typeface="Monaco"/>
-              </a:rPr>
-              <a:t>* r;</a:t>
+              <a:t> * r;</a:t>
             </a:r>
           </a:p>
           <a:p>
@@ -4265,7 +4244,7 @@
   <p:timing>
     <p:tnLst>
       <p:par>
-        <p:cTn id="1" dur="indefinite" restart="never" nodeType="tmRoot"/>
+        <p:cTn xmlns:p14="http://schemas.microsoft.com/office/powerpoint/2010/main" id="1" dur="indefinite" restart="never" nodeType="tmRoot"/>
       </p:par>
     </p:tnLst>
   </p:timing>
@@ -4824,7 +4803,7 @@
   <p:timing>
     <p:tnLst>
       <p:par>
-        <p:cTn id="1" dur="indefinite" restart="never" nodeType="tmRoot"/>
+        <p:cTn xmlns:p14="http://schemas.microsoft.com/office/powerpoint/2010/main" id="1" dur="indefinite" restart="never" nodeType="tmRoot"/>
       </p:par>
     </p:tnLst>
   </p:timing>
@@ -4875,6 +4854,9 @@
             </a:r>
             <a:r>
               <a:rPr lang="en-US" sz="1800" dirty="0" err="1" smtClean="0">
+                <a:solidFill>
+                  <a:srgbClr val="FF0000"/>
+                </a:solidFill>
                 <a:latin typeface="Monaco"/>
                 <a:cs typeface="Monaco"/>
               </a:rPr>
@@ -4896,10 +4878,20 @@
             </a:r>
             <a:r>
               <a:rPr lang="en-US" sz="1800" dirty="0" smtClean="0">
-                <a:latin typeface="Monaco"/>
-                <a:cs typeface="Monaco"/>
-              </a:rPr>
-              <a:t>require('module')</a:t>
+                <a:solidFill>
+                  <a:srgbClr val="FF0000"/>
+                </a:solidFill>
+                <a:latin typeface="Monaco"/>
+                <a:cs typeface="Monaco"/>
+              </a:rPr>
+              <a:t>require</a:t>
+            </a:r>
+            <a:r>
+              <a:rPr lang="en-US" sz="1800" dirty="0" smtClean="0">
+                <a:latin typeface="Monaco"/>
+                <a:cs typeface="Monaco"/>
+              </a:rPr>
+              <a:t>('module')</a:t>
             </a:r>
           </a:p>
           <a:p>
@@ -4908,7 +4900,11 @@
               <a:t>Writing modules: remember </a:t>
             </a:r>
             <a:r>
-              <a:rPr lang="en-US" sz="2000" dirty="0" err="1" smtClean="0"/>
+              <a:rPr lang="en-US" sz="2000" dirty="0" err="1" smtClean="0">
+                <a:solidFill>
+                  <a:srgbClr val="FF0000"/>
+                </a:solidFill>
+              </a:rPr>
               <a:t>index.js</a:t>
             </a:r>
             <a:r>
@@ -4916,15 +4912,30 @@
               <a:t>, </a:t>
             </a:r>
             <a:r>
-              <a:rPr lang="en-US" sz="2000" dirty="0" err="1" smtClean="0"/>
+              <a:rPr lang="en-US" sz="2000" dirty="0" err="1" smtClean="0">
+                <a:solidFill>
+                  <a:srgbClr val="FF0000"/>
+                </a:solidFill>
+              </a:rPr>
               <a:t>package.json</a:t>
             </a:r>
             <a:r>
+              <a:rPr lang="en-US" sz="2000" dirty="0" smtClean="0">
+                <a:solidFill>
+                  <a:srgbClr val="FF0000"/>
+                </a:solidFill>
+              </a:rPr>
+              <a:t> </a:t>
+            </a:r>
+            <a:r>
               <a:rPr lang="en-US" sz="2000" dirty="0" smtClean="0"/>
-              <a:t> &amp; </a:t>
+              <a:t>&amp; </a:t>
             </a:r>
             <a:r>
               <a:rPr lang="en-US" sz="1800" dirty="0" smtClean="0">
+                <a:solidFill>
+                  <a:srgbClr val="FF0000"/>
+                </a:solidFill>
                 <a:latin typeface="Monaco"/>
                 <a:cs typeface="Monaco"/>
               </a:rPr>
@@ -5019,7 +5030,7 @@
   <p:timing>
     <p:tnLst>
       <p:par>
-        <p:cTn id="1" dur="indefinite" restart="never" nodeType="tmRoot"/>
+        <p:cTn xmlns:p14="http://schemas.microsoft.com/office/powerpoint/2010/main" id="1" dur="indefinite" restart="never" nodeType="tmRoot"/>
       </p:par>
     </p:tnLst>
   </p:timing>
@@ -5180,7 +5191,7 @@
   <p:timing>
     <p:tnLst>
       <p:par>
-        <p:cTn id="1" dur="indefinite" restart="never" nodeType="tmRoot"/>
+        <p:cTn xmlns:p14="http://schemas.microsoft.com/office/powerpoint/2010/main" id="1" dur="indefinite" restart="never" nodeType="tmRoot"/>
       </p:par>
     </p:tnLst>
   </p:timing>
@@ -5256,13 +5267,20 @@
             </a:r>
             <a:r>
               <a:rPr lang="en-US" sz="2000" dirty="0">
+                <a:solidFill>
+                  <a:srgbClr val="FF0000"/>
+                </a:solidFill>
                 <a:latin typeface="Monaco"/>
                 <a:cs typeface="Monaco"/>
               </a:rPr>
               <a:t>require</a:t>
             </a:r>
             <a:r>
-              <a:rPr lang="en-US" dirty="0"/>
+              <a:rPr lang="en-US" dirty="0">
+                <a:solidFill>
+                  <a:srgbClr val="FF0000"/>
+                </a:solidFill>
+              </a:rPr>
               <a:t> </a:t>
             </a:r>
             <a:r>
@@ -5370,7 +5388,7 @@
   <p:timing>
     <p:tnLst>
       <p:par>
-        <p:cTn id="1" dur="indefinite" restart="never" nodeType="tmRoot"/>
+        <p:cTn xmlns:p14="http://schemas.microsoft.com/office/powerpoint/2010/main" id="1" dur="indefinite" restart="never" nodeType="tmRoot"/>
       </p:par>
     </p:tnLst>
   </p:timing>
@@ -6275,7 +6293,7 @@
   <p:timing>
     <p:tnLst>
       <p:par>
-        <p:cTn id="1" dur="indefinite" restart="never" nodeType="tmRoot"/>
+        <p:cTn xmlns:p14="http://schemas.microsoft.com/office/powerpoint/2010/main" id="1" dur="indefinite" restart="never" nodeType="tmRoot"/>
       </p:par>
     </p:tnLst>
   </p:timing>
@@ -6777,7 +6795,7 @@
   <p:timing>
     <p:tnLst>
       <p:par>
-        <p:cTn id="1" dur="indefinite" restart="never" nodeType="tmRoot"/>
+        <p:cTn xmlns:p14="http://schemas.microsoft.com/office/powerpoint/2010/main" id="1" dur="indefinite" restart="never" nodeType="tmRoot"/>
       </p:par>
     </p:tnLst>
   </p:timing>
@@ -6829,14 +6847,25 @@
             </a:r>
             <a:r>
               <a:rPr lang="en-US" sz="2000" dirty="0" err="1" smtClean="0">
+                <a:solidFill>
+                  <a:srgbClr val="FF0000"/>
+                </a:solidFill>
                 <a:latin typeface="Monaco"/>
                 <a:cs typeface="Monaco"/>
               </a:rPr>
               <a:t>node_modules</a:t>
             </a:r>
             <a:r>
+              <a:rPr lang="en-US" dirty="0" smtClean="0">
+                <a:solidFill>
+                  <a:srgbClr val="FF0000"/>
+                </a:solidFill>
+              </a:rPr>
+              <a:t> </a:t>
+            </a:r>
+            <a:r>
               <a:rPr lang="en-US" dirty="0" smtClean="0"/>
-              <a:t> directory in </a:t>
+              <a:t>directory in </a:t>
             </a:r>
             <a:r>
               <a:rPr lang="en-US" sz="2000" dirty="0" err="1" smtClean="0">
@@ -6924,13 +6953,20 @@
             </a:r>
             <a:r>
               <a:rPr lang="en-US" sz="1800" dirty="0" err="1">
+                <a:solidFill>
+                  <a:srgbClr val="FF0000"/>
+                </a:solidFill>
                 <a:latin typeface="Monaco"/>
                 <a:cs typeface="Monaco"/>
               </a:rPr>
               <a:t>node_modules</a:t>
             </a:r>
             <a:r>
-              <a:rPr lang="en-US" dirty="0"/>
+              <a:rPr lang="en-US" dirty="0">
+                <a:solidFill>
+                  <a:srgbClr val="FF0000"/>
+                </a:solidFill>
+              </a:rPr>
               <a:t> </a:t>
             </a:r>
             <a:r>
@@ -6963,18 +6999,38 @@
               <a:t>If a directory, look for </a:t>
             </a:r>
             <a:r>
-              <a:rPr lang="en-US" dirty="0" err="1" smtClean="0"/>
+              <a:rPr lang="en-US" dirty="0" err="1" smtClean="0">
+                <a:solidFill>
+                  <a:srgbClr val="FF0000"/>
+                </a:solidFill>
+              </a:rPr>
               <a:t>package.json</a:t>
             </a:r>
             <a:r>
+              <a:rPr lang="en-US" dirty="0" smtClean="0">
+                <a:solidFill>
+                  <a:srgbClr val="FF0000"/>
+                </a:solidFill>
+              </a:rPr>
+              <a:t> </a:t>
+            </a:r>
+            <a:r>
               <a:rPr lang="en-US" dirty="0" smtClean="0"/>
-              <a:t> or </a:t>
-            </a:r>
-            <a:r>
-              <a:rPr lang="en-US" dirty="0" err="1" smtClean="0"/>
+              <a:t>or </a:t>
+            </a:r>
+            <a:r>
+              <a:rPr lang="en-US" dirty="0" err="1" smtClean="0">
+                <a:solidFill>
+                  <a:srgbClr val="FF0000"/>
+                </a:solidFill>
+              </a:rPr>
               <a:t>index.js</a:t>
             </a:r>
-            <a:endParaRPr lang="en-US" dirty="0" smtClean="0"/>
+            <a:endParaRPr lang="en-US" dirty="0" smtClean="0">
+              <a:solidFill>
+                <a:srgbClr val="FF0000"/>
+              </a:solidFill>
+            </a:endParaRPr>
           </a:p>
           <a:p>
             <a:endParaRPr lang="en-US" dirty="0"/>
@@ -7073,7 +7129,7 @@
   <p:timing>
     <p:tnLst>
       <p:par>
-        <p:cTn id="1" dur="indefinite" restart="never" nodeType="tmRoot"/>
+        <p:cTn xmlns:p14="http://schemas.microsoft.com/office/powerpoint/2010/main" id="1" dur="indefinite" restart="never" nodeType="tmRoot"/>
       </p:par>
     </p:tnLst>
   </p:timing>
@@ -7122,14 +7178,25 @@
             </a:r>
             <a:r>
               <a:rPr lang="en-US" sz="2000" dirty="0" err="1" smtClean="0">
+                <a:solidFill>
+                  <a:srgbClr val="FF0000"/>
+                </a:solidFill>
                 <a:latin typeface="Monaco"/>
                 <a:cs typeface="Monaco"/>
               </a:rPr>
               <a:t>package.json</a:t>
             </a:r>
             <a:r>
+              <a:rPr lang="en-US" dirty="0" smtClean="0">
+                <a:solidFill>
+                  <a:srgbClr val="FF0000"/>
+                </a:solidFill>
+              </a:rPr>
+              <a:t> </a:t>
+            </a:r>
+            <a:r>
               <a:rPr lang="en-US" dirty="0" smtClean="0"/>
-              <a:t> can be specified in the root of the module folder as a single entry point to a library</a:t>
+              <a:t>can be specified in the root of the module folder as a single entry point to a library</a:t>
             </a:r>
           </a:p>
           <a:p>
@@ -7232,7 +7299,7 @@
               <a:t>foo.js</a:t>
             </a:r>
             <a:r>
-              <a:rPr lang="en-US" sz="2000" smtClean="0">
+              <a:rPr lang="en-US" sz="2000" dirty="0" smtClean="0">
                 <a:solidFill>
                   <a:srgbClr val="000000"/>
                 </a:solidFill>
@@ -7270,20 +7337,44 @@
               <a:t>If there is no </a:t>
             </a:r>
             <a:r>
-              <a:rPr lang="en-US" dirty="0" err="1"/>
+              <a:rPr lang="en-US" dirty="0" err="1">
+                <a:solidFill>
+                  <a:srgbClr val="FF0000"/>
+                </a:solidFill>
+              </a:rPr>
               <a:t>package.json</a:t>
             </a:r>
             <a:r>
+              <a:rPr lang="en-US" dirty="0">
+                <a:solidFill>
+                  <a:srgbClr val="FF0000"/>
+                </a:solidFill>
+              </a:rPr>
+              <a:t> </a:t>
+            </a:r>
+            <a:r>
               <a:rPr lang="en-US" dirty="0"/>
-              <a:t> present, node will attempt to load an </a:t>
-            </a:r>
-            <a:r>
-              <a:rPr lang="en-US" dirty="0" err="1"/>
+              <a:t>present, node will attempt to load an </a:t>
+            </a:r>
+            <a:r>
+              <a:rPr lang="en-US" dirty="0" err="1">
+                <a:solidFill>
+                  <a:srgbClr val="FF0000"/>
+                </a:solidFill>
+              </a:rPr>
               <a:t>index.js</a:t>
             </a:r>
             <a:r>
+              <a:rPr lang="en-US" dirty="0">
+                <a:solidFill>
+                  <a:srgbClr val="FF0000"/>
+                </a:solidFill>
+              </a:rPr>
+              <a:t> </a:t>
+            </a:r>
+            <a:r>
               <a:rPr lang="en-US" dirty="0"/>
-              <a:t> file</a:t>
+              <a:t>file</a:t>
             </a:r>
           </a:p>
           <a:p>
@@ -7382,7 +7473,7 @@
   <p:timing>
     <p:tnLst>
       <p:par>
-        <p:cTn id="1" dur="indefinite" restart="never" nodeType="tmRoot"/>
+        <p:cTn xmlns:p14="http://schemas.microsoft.com/office/powerpoint/2010/main" id="1" dur="indefinite" restart="never" nodeType="tmRoot"/>
       </p:par>
     </p:tnLst>
   </p:timing>
@@ -8047,7 +8138,7 @@
   <p:timing>
     <p:tnLst>
       <p:par>
-        <p:cTn id="1" dur="indefinite" restart="never" nodeType="tmRoot"/>
+        <p:cTn xmlns:p14="http://schemas.microsoft.com/office/powerpoint/2010/main" id="1" dur="indefinite" restart="never" nodeType="tmRoot"/>
       </p:par>
     </p:tnLst>
   </p:timing>
@@ -8111,14 +8202,25 @@
           <a:p>
             <a:r>
               <a:rPr lang="en-US" sz="2000" dirty="0" err="1" smtClean="0">
+                <a:solidFill>
+                  <a:srgbClr val="FF0000"/>
+                </a:solidFill>
                 <a:latin typeface="Monaco"/>
                 <a:cs typeface="Monaco"/>
               </a:rPr>
               <a:t>npm</a:t>
             </a:r>
             <a:r>
+              <a:rPr lang="en-US" dirty="0" smtClean="0">
+                <a:solidFill>
+                  <a:srgbClr val="FF0000"/>
+                </a:solidFill>
+              </a:rPr>
+              <a:t> </a:t>
+            </a:r>
+            <a:r>
               <a:rPr lang="en-US" dirty="0" smtClean="0"/>
-              <a:t> uses semantic versioning for all modules and dependencies can be specified with the format 1.0.x</a:t>
+              <a:t>uses semantic versioning for all modules and dependencies can be specified with the format 1.0.x</a:t>
             </a:r>
           </a:p>
           <a:p>
@@ -8231,7 +8333,7 @@
   <p:timing>
     <p:tnLst>
       <p:par>
-        <p:cTn id="1" dur="indefinite" restart="never" nodeType="tmRoot"/>
+        <p:cTn xmlns:p14="http://schemas.microsoft.com/office/powerpoint/2010/main" id="1" dur="indefinite" restart="never" nodeType="tmRoot"/>
       </p:par>
     </p:tnLst>
   </p:timing>

</xml_diff>